<commit_message>
prepare for crashcourse 2015
</commit_message>
<xml_diff>
--- a/Design.pptx
+++ b/Design.pptx
@@ -101,7 +101,7 @@
     <p:sldId id="349" r:id="rId92"/>
     <p:sldId id="347" r:id="rId93"/>
     <p:sldId id="318" r:id="rId94"/>
-    <p:sldId id="382" r:id="rId95"/>
+    <p:sldId id="384" r:id="rId95"/>
   </p:sldIdLst>
   <p:sldSz cx="9144000" cy="6858000" type="screen4x3"/>
   <p:notesSz cx="6858000" cy="9144000"/>
@@ -329,7 +329,7 @@
             <p14:sldId id="381"/>
           </p14:sldIdLst>
         </p14:section>
-        <p14:section name="DEP 20м" id="{142419B8-DB63-4742-9FDE-8BD9C55A2F97}">
+        <p14:section name="DEP 20м + 40м" id="{142419B8-DB63-4742-9FDE-8BD9C55A2F97}">
           <p14:sldIdLst>
             <p14:sldId id="362"/>
             <p14:sldId id="351"/>
@@ -338,7 +338,7 @@
             <p14:sldId id="349"/>
             <p14:sldId id="347"/>
             <p14:sldId id="318"/>
-            <p14:sldId id="382"/>
+            <p14:sldId id="384"/>
           </p14:sldIdLst>
         </p14:section>
       </p14:sectionLst>
@@ -444,7 +444,7 @@
           <a:p>
             <a:fld id="{1D12B38D-150E-44F0-AD67-CE4A0E7D73CD}" type="datetimeFigureOut">
               <a:rPr lang="ru-RU" smtClean="0"/>
-              <a:t>21.02.2015</a:t>
+              <a:t>28.04.2015</a:t>
             </a:fld>
             <a:endParaRPr lang="ru-RU"/>
           </a:p>
@@ -3672,7 +3672,7 @@
           <a:p>
             <a:fld id="{03713669-593F-460C-B61F-C43E6BD11A61}" type="datetimeFigureOut">
               <a:rPr lang="ru-RU" smtClean="0"/>
-              <a:t>21.02.2015</a:t>
+              <a:t>28.04.2015</a:t>
             </a:fld>
             <a:endParaRPr lang="ru-RU"/>
           </a:p>
@@ -3842,7 +3842,7 @@
           <a:p>
             <a:fld id="{03713669-593F-460C-B61F-C43E6BD11A61}" type="datetimeFigureOut">
               <a:rPr lang="ru-RU" smtClean="0"/>
-              <a:t>21.02.2015</a:t>
+              <a:t>28.04.2015</a:t>
             </a:fld>
             <a:endParaRPr lang="ru-RU"/>
           </a:p>
@@ -4022,7 +4022,7 @@
           <a:p>
             <a:fld id="{03713669-593F-460C-B61F-C43E6BD11A61}" type="datetimeFigureOut">
               <a:rPr lang="ru-RU" smtClean="0"/>
-              <a:t>21.02.2015</a:t>
+              <a:t>28.04.2015</a:t>
             </a:fld>
             <a:endParaRPr lang="ru-RU"/>
           </a:p>
@@ -4192,7 +4192,7 @@
           <a:p>
             <a:fld id="{03713669-593F-460C-B61F-C43E6BD11A61}" type="datetimeFigureOut">
               <a:rPr lang="ru-RU" smtClean="0"/>
-              <a:t>21.02.2015</a:t>
+              <a:t>28.04.2015</a:t>
             </a:fld>
             <a:endParaRPr lang="ru-RU"/>
           </a:p>
@@ -4436,7 +4436,7 @@
           <a:p>
             <a:fld id="{03713669-593F-460C-B61F-C43E6BD11A61}" type="datetimeFigureOut">
               <a:rPr lang="ru-RU" smtClean="0"/>
-              <a:t>21.02.2015</a:t>
+              <a:t>28.04.2015</a:t>
             </a:fld>
             <a:endParaRPr lang="ru-RU"/>
           </a:p>
@@ -4668,7 +4668,7 @@
           <a:p>
             <a:fld id="{03713669-593F-460C-B61F-C43E6BD11A61}" type="datetimeFigureOut">
               <a:rPr lang="ru-RU" smtClean="0"/>
-              <a:t>21.02.2015</a:t>
+              <a:t>28.04.2015</a:t>
             </a:fld>
             <a:endParaRPr lang="ru-RU"/>
           </a:p>
@@ -5035,7 +5035,7 @@
           <a:p>
             <a:fld id="{03713669-593F-460C-B61F-C43E6BD11A61}" type="datetimeFigureOut">
               <a:rPr lang="ru-RU" smtClean="0"/>
-              <a:t>21.02.2015</a:t>
+              <a:t>28.04.2015</a:t>
             </a:fld>
             <a:endParaRPr lang="ru-RU"/>
           </a:p>
@@ -5153,7 +5153,7 @@
           <a:p>
             <a:fld id="{03713669-593F-460C-B61F-C43E6BD11A61}" type="datetimeFigureOut">
               <a:rPr lang="ru-RU" smtClean="0"/>
-              <a:t>21.02.2015</a:t>
+              <a:t>28.04.2015</a:t>
             </a:fld>
             <a:endParaRPr lang="ru-RU"/>
           </a:p>
@@ -5248,7 +5248,7 @@
           <a:p>
             <a:fld id="{03713669-593F-460C-B61F-C43E6BD11A61}" type="datetimeFigureOut">
               <a:rPr lang="ru-RU" smtClean="0"/>
-              <a:t>21.02.2015</a:t>
+              <a:t>28.04.2015</a:t>
             </a:fld>
             <a:endParaRPr lang="ru-RU"/>
           </a:p>
@@ -5525,7 +5525,7 @@
           <a:p>
             <a:fld id="{03713669-593F-460C-B61F-C43E6BD11A61}" type="datetimeFigureOut">
               <a:rPr lang="ru-RU" smtClean="0"/>
-              <a:t>21.02.2015</a:t>
+              <a:t>28.04.2015</a:t>
             </a:fld>
             <a:endParaRPr lang="ru-RU"/>
           </a:p>
@@ -5782,7 +5782,7 @@
           <a:p>
             <a:fld id="{03713669-593F-460C-B61F-C43E6BD11A61}" type="datetimeFigureOut">
               <a:rPr lang="ru-RU" smtClean="0"/>
-              <a:t>21.02.2015</a:t>
+              <a:t>28.04.2015</a:t>
             </a:fld>
             <a:endParaRPr lang="ru-RU"/>
           </a:p>
@@ -5995,7 +5995,7 @@
           <a:p>
             <a:fld id="{03713669-593F-460C-B61F-C43E6BD11A61}" type="datetimeFigureOut">
               <a:rPr lang="ru-RU" smtClean="0"/>
-              <a:t>21.02.2015</a:t>
+              <a:t>28.04.2015</a:t>
             </a:fld>
             <a:endParaRPr lang="ru-RU"/>
           </a:p>
@@ -6438,6 +6438,55 @@
           <a:bodyPr/>
           <a:lstStyle/>
           <a:p>
+            <a:r>
+              <a:rPr lang="ru-RU" dirty="0" smtClean="0"/>
+              <a:t>Сделайте</a:t>
+            </a:r>
+            <a:r>
+              <a:rPr lang="en-US" dirty="0" smtClean="0"/>
+              <a:t> fork </a:t>
+            </a:r>
+            <a:r>
+              <a:rPr lang="ru-RU" dirty="0" smtClean="0"/>
+              <a:t>и </a:t>
+            </a:r>
+            <a:r>
+              <a:rPr lang="en-US" dirty="0" smtClean="0"/>
+              <a:t>clone</a:t>
+            </a:r>
+            <a:r>
+              <a:rPr lang="ru-RU" dirty="0" smtClean="0"/>
+              <a:t> </a:t>
+            </a:r>
+            <a:r>
+              <a:rPr lang="ru-RU" dirty="0" err="1" smtClean="0"/>
+              <a:t>репозитория</a:t>
+            </a:r>
+            <a:r>
+              <a:rPr lang="ru-RU" dirty="0"/>
+              <a:t/>
+            </a:r>
+            <a:br>
+              <a:rPr lang="ru-RU" dirty="0"/>
+            </a:br>
+            <a:r>
+              <a:rPr lang="en-US" dirty="0">
+                <a:hlinkClick r:id="rId2"/>
+              </a:rPr>
+              <a:t>https://github.com/kontur</a:t>
+            </a:r>
+            <a:r>
+              <a:rPr lang="ru-RU" dirty="0">
+                <a:hlinkClick r:id="rId2"/>
+              </a:rPr>
+              <a:t>-</a:t>
+            </a:r>
+            <a:r>
+              <a:rPr lang="en-US" dirty="0">
+                <a:hlinkClick r:id="rId2"/>
+              </a:rPr>
+              <a:t>intern-2015/design</a:t>
+            </a:r>
             <a:endParaRPr lang="ru-RU" dirty="0"/>
           </a:p>
         </p:txBody>
@@ -9788,7 +9837,7 @@
         <p:spPr/>
         <p:txBody>
           <a:bodyPr>
-            <a:normAutofit fontScale="90000"/>
+            <a:normAutofit/>
           </a:bodyPr>
           <a:lstStyle/>
           <a:p>
@@ -9803,29 +9852,6 @@
             <a:r>
               <a:rPr lang="en-US" b="1" dirty="0" err="1" smtClean="0"/>
               <a:t>FluentApi</a:t>
-            </a:r>
-            <a:r>
-              <a:rPr lang="en-US" dirty="0"/>
-              <a:t/>
-            </a:r>
-            <a:br>
-              <a:rPr lang="en-US" dirty="0"/>
-            </a:br>
-            <a:r>
-              <a:rPr lang="en-US" sz="3600" dirty="0">
-                <a:hlinkClick r:id="rId3"/>
-              </a:rPr>
-              <a:t>https://</a:t>
-            </a:r>
-            <a:r>
-              <a:rPr lang="en-US" sz="3600" dirty="0" smtClean="0">
-                <a:hlinkClick r:id="rId3"/>
-              </a:rPr>
-              <a:t>github.com/konturschool/03-design</a:t>
-            </a:r>
-            <a:r>
-              <a:rPr lang="en-US" sz="3600" dirty="0" smtClean="0"/>
-              <a:t> </a:t>
             </a:r>
             <a:endParaRPr lang="ru-RU" dirty="0"/>
           </a:p>
@@ -16189,31 +16215,8 @@
               <a:t>Задача </a:t>
             </a:r>
             <a:r>
-              <a:rPr lang="en-US" b="1" dirty="0" err="1"/>
+              <a:rPr lang="en-US" b="1" dirty="0" err="1" smtClean="0"/>
               <a:t>PerfLogger</a:t>
-            </a:r>
-            <a:r>
-              <a:rPr lang="en-US" b="1" dirty="0"/>
-              <a:t/>
-            </a:r>
-            <a:br>
-              <a:rPr lang="en-US" b="1" dirty="0"/>
-            </a:br>
-            <a:r>
-              <a:rPr lang="en-US" sz="3100" dirty="0">
-                <a:hlinkClick r:id="rId3"/>
-              </a:rPr>
-              <a:t>https://</a:t>
-            </a:r>
-            <a:r>
-              <a:rPr lang="en-US" sz="3100" dirty="0" smtClean="0">
-                <a:hlinkClick r:id="rId3"/>
-              </a:rPr>
-              <a:t>github.com/konturschool/03-design</a:t>
-            </a:r>
-            <a:r>
-              <a:rPr lang="en-US" sz="3100" dirty="0" smtClean="0"/>
-              <a:t> </a:t>
             </a:r>
             <a:endParaRPr lang="ru-RU" sz="1600" dirty="0">
               <a:solidFill>
@@ -37548,7 +37551,7 @@
         <p:spPr/>
         <p:txBody>
           <a:bodyPr>
-            <a:normAutofit fontScale="90000"/>
+            <a:normAutofit/>
           </a:bodyPr>
           <a:lstStyle/>
           <a:p>
@@ -37559,25 +37562,6 @@
             <a:r>
               <a:rPr lang="en-US" b="1" dirty="0" err="1" smtClean="0"/>
               <a:t>DIContainer</a:t>
-            </a:r>
-            <a:r>
-              <a:rPr lang="en-US" b="1" dirty="0" smtClean="0"/>
-              <a:t/>
-            </a:r>
-            <a:br>
-              <a:rPr lang="en-US" b="1" dirty="0" smtClean="0"/>
-            </a:br>
-            <a:r>
-              <a:rPr lang="en-US" sz="3600" dirty="0">
-                <a:hlinkClick r:id="rId2"/>
-              </a:rPr>
-              <a:t>https://</a:t>
-            </a:r>
-            <a:r>
-              <a:rPr lang="en-US" sz="3600" dirty="0" smtClean="0">
-                <a:hlinkClick r:id="rId2"/>
-              </a:rPr>
-              <a:t>github.com/konturschool/03-design</a:t>
             </a:r>
             <a:endParaRPr lang="ru-RU" b="1" dirty="0"/>
           </a:p>
@@ -42034,16 +42018,12 @@
           <a:lstStyle/>
           <a:p>
             <a:r>
-              <a:rPr lang="ru-RU" dirty="0" err="1" smtClean="0"/>
-              <a:t>Домашка</a:t>
-            </a:r>
-            <a:r>
-              <a:rPr lang="en-US" dirty="0" smtClean="0"/>
-              <a:t> </a:t>
-            </a:r>
-            <a:r>
-              <a:rPr lang="en-US" b="1" dirty="0" err="1" smtClean="0"/>
-              <a:t>HomeWork</a:t>
+              <a:rPr lang="ru-RU" dirty="0" smtClean="0"/>
+              <a:t>Задача </a:t>
+            </a:r>
+            <a:r>
+              <a:rPr lang="en-US" b="1" dirty="0" err="1"/>
+              <a:t>DependencyElimination</a:t>
             </a:r>
             <a:endParaRPr lang="ru-RU" b="1" dirty="0"/>
           </a:p>
@@ -42061,201 +42041,57 @@
         </p:nvSpPr>
         <p:spPr/>
         <p:txBody>
-          <a:bodyPr>
-            <a:normAutofit lnSpcReduction="10000"/>
-          </a:bodyPr>
+          <a:bodyPr/>
           <a:lstStyle/>
           <a:p>
-            <a:pPr marL="514350" indent="-514350">
-              <a:buAutoNum type="arabicPeriod"/>
-            </a:pPr>
-            <a:r>
-              <a:rPr lang="en-US" dirty="0" smtClean="0"/>
-              <a:t>DI </a:t>
+            <a:r>
+              <a:rPr lang="ru-RU" dirty="0" err="1" smtClean="0"/>
+              <a:t>Отрефакторить</a:t>
             </a:r>
             <a:r>
               <a:rPr lang="ru-RU" dirty="0" smtClean="0"/>
-              <a:t>в классе </a:t>
-            </a:r>
-            <a:r>
-              <a:rPr lang="en-US" dirty="0" err="1" smtClean="0"/>
-              <a:t>AiTester</a:t>
-            </a:r>
-            <a:endParaRPr lang="en-US" dirty="0"/>
-          </a:p>
-          <a:p>
-            <a:pPr marL="514350" indent="-514350">
-              <a:buAutoNum type="arabicPeriod"/>
-            </a:pPr>
-            <a:r>
-              <a:rPr lang="en-US" dirty="0" err="1" smtClean="0"/>
-              <a:t>Ninject</a:t>
-            </a:r>
-            <a:r>
-              <a:rPr lang="en-US" dirty="0" smtClean="0"/>
-              <a:t> </a:t>
-            </a:r>
+              <a:t> код</a:t>
+            </a:r>
+          </a:p>
+          <a:p>
             <a:r>
               <a:rPr lang="ru-RU" dirty="0" smtClean="0"/>
-              <a:t>в </a:t>
-            </a:r>
-            <a:r>
-              <a:rPr lang="en-US" dirty="0" smtClean="0"/>
-              <a:t>Program</a:t>
-            </a:r>
-          </a:p>
-          <a:p>
-            <a:pPr marL="514350" indent="-514350">
-              <a:buAutoNum type="arabicPeriod"/>
-            </a:pPr>
+              <a:t>Код должен распасться на модули:</a:t>
+            </a:r>
+          </a:p>
+          <a:p>
+            <a:pPr lvl="1"/>
             <a:r>
               <a:rPr lang="ru-RU" dirty="0" smtClean="0"/>
-              <a:t>В отдельной ветке — </a:t>
-            </a:r>
-            <a:r>
-              <a:rPr lang="en-US" dirty="0" smtClean="0"/>
-              <a:t>DEP </a:t>
-            </a:r>
+              <a:t>не связанные даже по интерфейсам</a:t>
+            </a:r>
+          </a:p>
+          <a:p>
+            <a:pPr lvl="1"/>
             <a:r>
               <a:rPr lang="ru-RU" dirty="0" smtClean="0"/>
-              <a:t>в </a:t>
-            </a:r>
-            <a:r>
-              <a:rPr lang="en-US" dirty="0" err="1" smtClean="0"/>
-              <a:t>AiTester</a:t>
-            </a:r>
+              <a:t>повторно используемые</a:t>
+            </a:r>
+          </a:p>
+          <a:p>
+            <a:pPr lvl="1"/>
             <a:r>
               <a:rPr lang="ru-RU" dirty="0" smtClean="0"/>
-              <a:t>:</a:t>
-            </a:r>
-          </a:p>
-          <a:p>
-            <a:pPr marL="971550" lvl="1" indent="-514350">
-              <a:buAutoNum type="arabicPeriod"/>
-            </a:pPr>
-            <a:r>
-              <a:rPr lang="ru-RU" dirty="0" smtClean="0"/>
-              <a:t>Убрать зависимость </a:t>
-            </a:r>
-            <a:r>
-              <a:rPr lang="en-US" dirty="0" smtClean="0"/>
-              <a:t>Ai</a:t>
-            </a:r>
-            <a:r>
-              <a:rPr lang="ru-RU" dirty="0" smtClean="0"/>
-              <a:t> от </a:t>
-            </a:r>
-            <a:r>
-              <a:rPr lang="en-US" dirty="0" err="1" smtClean="0"/>
-              <a:t>ProcessMonitor</a:t>
-            </a:r>
-            <a:endParaRPr lang="en-US" dirty="0" smtClean="0"/>
-          </a:p>
-          <a:p>
-            <a:pPr marL="971550" lvl="1" indent="-514350">
-              <a:buAutoNum type="arabicPeriod"/>
-            </a:pPr>
-            <a:r>
-              <a:rPr lang="ru-RU" dirty="0" smtClean="0"/>
-              <a:t>Отделить перезапуск </a:t>
-            </a:r>
-            <a:r>
-              <a:rPr lang="en-US" dirty="0" smtClean="0"/>
-              <a:t>Ai</a:t>
-            </a:r>
-          </a:p>
-          <a:p>
-            <a:pPr marL="971550" lvl="1" indent="-514350">
-              <a:buAutoNum type="arabicPeriod"/>
-            </a:pPr>
-            <a:r>
-              <a:rPr lang="ru-RU" dirty="0" smtClean="0"/>
-              <a:t>Отделить </a:t>
-            </a:r>
-            <a:r>
-              <a:rPr lang="ru-RU" dirty="0" err="1" smtClean="0"/>
-              <a:t>логгирование</a:t>
-            </a:r>
-            <a:endParaRPr lang="ru-RU" dirty="0" smtClean="0"/>
-          </a:p>
-          <a:p>
-            <a:pPr marL="971550" lvl="1" indent="-514350">
-              <a:buAutoNum type="arabicPeriod"/>
-            </a:pPr>
-            <a:r>
-              <a:rPr lang="ru-RU" dirty="0" smtClean="0"/>
-              <a:t>Отделить создание последовательности игр</a:t>
-            </a:r>
-          </a:p>
-          <a:p>
-            <a:pPr marL="971550" lvl="1" indent="-514350">
-              <a:buAutoNum type="arabicPeriod"/>
-            </a:pPr>
-            <a:r>
-              <a:rPr lang="ru-RU" dirty="0" smtClean="0"/>
-              <a:t>Отделить подсчет итоговой статистики</a:t>
-            </a:r>
-            <a:endParaRPr lang="en-US" dirty="0" smtClean="0"/>
-          </a:p>
-          <a:p>
-            <a:pPr marL="971550" lvl="1" indent="-514350">
-              <a:buAutoNum type="arabicPeriod"/>
-            </a:pPr>
-            <a:r>
-              <a:rPr lang="en-US" dirty="0" smtClean="0"/>
-              <a:t>DEP!</a:t>
-            </a:r>
-            <a:endParaRPr lang="ru-RU" dirty="0" smtClean="0"/>
-          </a:p>
-          <a:p>
-            <a:pPr marL="514350" indent="-514350">
-              <a:buAutoNum type="arabicPeriod"/>
-            </a:pPr>
-            <a:r>
-              <a:rPr lang="en-US" dirty="0" smtClean="0"/>
-              <a:t>[</a:t>
-            </a:r>
-            <a:r>
-              <a:rPr lang="ru-RU" dirty="0" smtClean="0"/>
-              <a:t>опционально</a:t>
-            </a:r>
-            <a:r>
-              <a:rPr lang="en-US" dirty="0" smtClean="0"/>
-              <a:t>]</a:t>
-            </a:r>
-            <a:r>
-              <a:rPr lang="ru-RU" dirty="0"/>
-              <a:t> </a:t>
-            </a:r>
-            <a:r>
-              <a:rPr lang="ru-RU" dirty="0" smtClean="0"/>
-              <a:t>попробовать </a:t>
-            </a:r>
-            <a:r>
-              <a:rPr lang="en-US" dirty="0" err="1" smtClean="0"/>
-              <a:t>FakeItEasy</a:t>
-            </a:r>
-            <a:endParaRPr lang="ru-RU" dirty="0" smtClean="0"/>
+              <a:t>легко тестируемые</a:t>
+            </a:r>
           </a:p>
         </p:txBody>
       </p:sp>
     </p:spTree>
     <p:extLst>
       <p:ext uri="{BB962C8B-B14F-4D97-AF65-F5344CB8AC3E}">
-        <p14:creationId xmlns:p14="http://schemas.microsoft.com/office/powerpoint/2010/main" val="1784461096"/>
+        <p14:creationId xmlns:p14="http://schemas.microsoft.com/office/powerpoint/2010/main" val="888315034"/>
       </p:ext>
     </p:extLst>
   </p:cSld>
   <p:clrMapOvr>
     <a:masterClrMapping/>
   </p:clrMapOvr>
-  <p:timing>
-    <p:tnLst>
-      <p:par>
-        <p:cTn id="1" dur="indefinite" restart="never" nodeType="tmRoot"/>
-      </p:par>
-    </p:tnLst>
-  </p:timing>
 </p:sld>
 </file>
 

</xml_diff>

<commit_message>
add task descriptions to Readme.md
</commit_message>
<xml_diff>
--- a/Design.pptx
+++ b/Design.pptx
@@ -9165,14 +9165,7 @@
                 <a:latin typeface="Consolas" panose="020B0609020204030204" pitchFamily="49" charset="0"/>
                 <a:cs typeface="Consolas" panose="020B0609020204030204" pitchFamily="49" charset="0"/>
               </a:rPr>
-              <a:t> </a:t>
-            </a:r>
-            <a:r>
-              <a:rPr lang="en-US" dirty="0" smtClean="0">
-                <a:latin typeface="Consolas" panose="020B0609020204030204" pitchFamily="49" charset="0"/>
-                <a:cs typeface="Consolas" panose="020B0609020204030204" pitchFamily="49" charset="0"/>
-              </a:rPr>
-              <a:t>reader)</a:t>
+              <a:t> reader)</a:t>
             </a:r>
             <a:br>
               <a:rPr lang="en-US" dirty="0" smtClean="0">
@@ -9415,14 +9408,7 @@
                 <a:latin typeface="Consolas" panose="020B0609020204030204" pitchFamily="49" charset="0"/>
                 <a:cs typeface="Consolas" panose="020B0609020204030204" pitchFamily="49" charset="0"/>
               </a:rPr>
-              <a:t>&gt; </a:t>
-            </a:r>
-            <a:r>
-              <a:rPr lang="en-US" dirty="0" smtClean="0">
-                <a:latin typeface="Consolas" panose="020B0609020204030204" pitchFamily="49" charset="0"/>
-                <a:cs typeface="Consolas" panose="020B0609020204030204" pitchFamily="49" charset="0"/>
-              </a:rPr>
-              <a:t>lines)</a:t>
+              <a:t>&gt; lines)</a:t>
             </a:r>
             <a:endParaRPr lang="en-US" dirty="0">
               <a:latin typeface="Consolas" panose="020B0609020204030204" pitchFamily="49" charset="0"/>
@@ -21998,15 +21984,6 @@
               </a:rPr>
               <a:t>  ...</a:t>
             </a:r>
-            <a:endParaRPr lang="en-US" sz="1800" dirty="0" smtClean="0">
-              <a:solidFill>
-                <a:srgbClr val="000000"/>
-              </a:solidFill>
-              <a:highlight>
-                <a:srgbClr val="FFFFFF"/>
-              </a:highlight>
-              <a:latin typeface="Consolas" panose="020B0609020204030204" pitchFamily="49" charset="0"/>
-            </a:endParaRPr>
           </a:p>
           <a:p>
             <a:pPr marL="0" indent="0">
@@ -22046,19 +22023,7 @@
                 </a:highlight>
                 <a:latin typeface="Consolas" panose="020B0609020204030204" pitchFamily="49" charset="0"/>
               </a:rPr>
-              <a:t>(input</a:t>
-            </a:r>
-            <a:r>
-              <a:rPr lang="en-US" sz="1800" dirty="0" smtClean="0">
-                <a:solidFill>
-                  <a:srgbClr val="000000"/>
-                </a:solidFill>
-                <a:highlight>
-                  <a:srgbClr val="FFFFFF"/>
-                </a:highlight>
-                <a:latin typeface="Consolas" panose="020B0609020204030204" pitchFamily="49" charset="0"/>
-              </a:rPr>
-              <a:t>, output);</a:t>
+              <a:t>(input, output);</a:t>
             </a:r>
           </a:p>
           <a:p>
@@ -22118,15 +22083,6 @@
               </a:rPr>
               <a:t>{</a:t>
             </a:r>
-            <a:endParaRPr lang="en-US" sz="1800" dirty="0" smtClean="0">
-              <a:solidFill>
-                <a:srgbClr val="000000"/>
-              </a:solidFill>
-              <a:highlight>
-                <a:srgbClr val="FFFFFF"/>
-              </a:highlight>
-              <a:latin typeface="Consolas" panose="020B0609020204030204" pitchFamily="49" charset="0"/>
-            </a:endParaRPr>
           </a:p>
           <a:p>
             <a:pPr marL="0" indent="0">
@@ -22238,15 +22194,6 @@
               </a:rPr>
               <a:t>}</a:t>
             </a:r>
-            <a:endParaRPr lang="en-US" sz="1800" dirty="0">
-              <a:solidFill>
-                <a:srgbClr val="000000"/>
-              </a:solidFill>
-              <a:highlight>
-                <a:srgbClr val="FFFFFF"/>
-              </a:highlight>
-              <a:latin typeface="Consolas" panose="020B0609020204030204" pitchFamily="49" charset="0"/>
-            </a:endParaRPr>
           </a:p>
           <a:p>
             <a:pPr marL="0" indent="0">
@@ -22797,15 +22744,6 @@
               </a:rPr>
               <a:t>    ...</a:t>
             </a:r>
-            <a:endParaRPr lang="en-US" sz="1800" dirty="0" smtClean="0">
-              <a:solidFill>
-                <a:srgbClr val="000000"/>
-              </a:solidFill>
-              <a:highlight>
-                <a:srgbClr val="FFFFFF"/>
-              </a:highlight>
-              <a:latin typeface="Consolas" panose="020B0609020204030204" pitchFamily="49" charset="0"/>
-            </a:endParaRPr>
           </a:p>
           <a:p>
             <a:pPr marL="0" indent="0">
@@ -22845,19 +22783,7 @@
                 </a:highlight>
                 <a:latin typeface="Consolas" panose="020B0609020204030204" pitchFamily="49" charset="0"/>
               </a:rPr>
-              <a:t>(input</a:t>
-            </a:r>
-            <a:r>
-              <a:rPr lang="en-US" sz="1800" dirty="0" smtClean="0">
-                <a:solidFill>
-                  <a:srgbClr val="000000"/>
-                </a:solidFill>
-                <a:highlight>
-                  <a:srgbClr val="FFFFFF"/>
-                </a:highlight>
-                <a:latin typeface="Consolas" panose="020B0609020204030204" pitchFamily="49" charset="0"/>
-              </a:rPr>
-              <a:t>, output);</a:t>
+              <a:t>(input, output);</a:t>
             </a:r>
           </a:p>
           <a:p>
@@ -22917,15 +22843,6 @@
               </a:rPr>
               <a:t>{</a:t>
             </a:r>
-            <a:endParaRPr lang="en-US" sz="1800" dirty="0" smtClean="0">
-              <a:solidFill>
-                <a:srgbClr val="000000"/>
-              </a:solidFill>
-              <a:highlight>
-                <a:srgbClr val="FFFFFF"/>
-              </a:highlight>
-              <a:latin typeface="Consolas" panose="020B0609020204030204" pitchFamily="49" charset="0"/>
-            </a:endParaRPr>
           </a:p>
           <a:p>
             <a:pPr marL="0" indent="0">
@@ -23066,15 +22983,6 @@
               </a:rPr>
               <a:t>}</a:t>
             </a:r>
-            <a:endParaRPr lang="en-US" sz="1800" dirty="0">
-              <a:solidFill>
-                <a:srgbClr val="000000"/>
-              </a:solidFill>
-              <a:highlight>
-                <a:srgbClr val="FFFFFF"/>
-              </a:highlight>
-              <a:latin typeface="Consolas" panose="020B0609020204030204" pitchFamily="49" charset="0"/>
-            </a:endParaRPr>
           </a:p>
           <a:p>
             <a:pPr marL="0" indent="0">
@@ -23638,31 +23546,7 @@
                 </a:highlight>
                 <a:latin typeface="Consolas" panose="020B0609020204030204" pitchFamily="49" charset="0"/>
               </a:rPr>
-              <a:t>(input</a:t>
-            </a:r>
-            <a:r>
-              <a:rPr lang="en-US" sz="1800" dirty="0" smtClean="0">
-                <a:solidFill>
-                  <a:srgbClr val="000000"/>
-                </a:solidFill>
-                <a:highlight>
-                  <a:srgbClr val="FFFFFF"/>
-                </a:highlight>
-                <a:latin typeface="Consolas" panose="020B0609020204030204" pitchFamily="49" charset="0"/>
-              </a:rPr>
-              <a:t>, output</a:t>
-            </a:r>
-            <a:r>
-              <a:rPr lang="en-US" sz="1800" dirty="0" smtClean="0">
-                <a:solidFill>
-                  <a:srgbClr val="000000"/>
-                </a:solidFill>
-                <a:highlight>
-                  <a:srgbClr val="FFFFFF"/>
-                </a:highlight>
-                <a:latin typeface="Consolas" panose="020B0609020204030204" pitchFamily="49" charset="0"/>
-              </a:rPr>
-              <a:t>);</a:t>
+              <a:t>(input, output);</a:t>
             </a:r>
           </a:p>
           <a:p>
@@ -23899,11 +23783,7 @@
           <a:p>
             <a:r>
               <a:rPr lang="ru-RU" dirty="0" smtClean="0"/>
-              <a:t>Можно </a:t>
-            </a:r>
-            <a:r>
-              <a:rPr lang="ru-RU" dirty="0" smtClean="0"/>
-              <a:t>обобщить</a:t>
+              <a:t>Можно обобщить</a:t>
             </a:r>
             <a:endParaRPr lang="ru-RU" dirty="0"/>
           </a:p>
@@ -23937,13 +23817,8 @@
             </a:r>
             <a:r>
               <a:rPr lang="ru-RU" dirty="0" smtClean="0"/>
-              <a:t>нечто с началом и </a:t>
-            </a:r>
-            <a:r>
-              <a:rPr lang="ru-RU" dirty="0" smtClean="0"/>
-              <a:t>концом</a:t>
-            </a:r>
-            <a:endParaRPr lang="ru-RU" dirty="0" smtClean="0"/>
+              <a:t>нечто с началом и концом</a:t>
+            </a:r>
           </a:p>
           <a:p>
             <a:pPr marL="0" indent="0">
@@ -23970,11 +23845,7 @@
             </a:pPr>
             <a:r>
               <a:rPr lang="ru-RU" dirty="0" smtClean="0"/>
-              <a:t>и отразить начало и конец в структуре </a:t>
-            </a:r>
-            <a:r>
-              <a:rPr lang="ru-RU" dirty="0" smtClean="0"/>
-              <a:t>программы</a:t>
+              <a:t>и отразить начало и конец в структуре программы</a:t>
             </a:r>
             <a:endParaRPr lang="ru-RU" dirty="0"/>
           </a:p>
@@ -25206,19 +25077,7 @@
                 </a:highlight>
                 <a:latin typeface="Consolas" panose="020B0609020204030204" pitchFamily="49" charset="0"/>
               </a:rPr>
-              <a:t>)</a:t>
-            </a:r>
-            <a:r>
-              <a:rPr lang="en-US" sz="1800" dirty="0" smtClean="0">
-                <a:solidFill>
-                  <a:srgbClr val="000000"/>
-                </a:solidFill>
-                <a:highlight>
-                  <a:srgbClr val="FFFFFF"/>
-                </a:highlight>
-                <a:latin typeface="Consolas" panose="020B0609020204030204" pitchFamily="49" charset="0"/>
-              </a:rPr>
-              <a:t>))</a:t>
+              <a:t>)))</a:t>
             </a:r>
             <a:endParaRPr lang="en-US" sz="1800" dirty="0">
               <a:solidFill>
@@ -29268,7 +29127,6 @@
               <a:rPr lang="en-US" dirty="0" smtClean="0"/>
               <a:t>Domain)!</a:t>
             </a:r>
-            <a:endParaRPr lang="en-US" dirty="0" smtClean="0"/>
           </a:p>
         </p:txBody>
       </p:sp>
@@ -39665,11 +39523,7 @@
           <a:p>
             <a:r>
               <a:rPr lang="ru-RU" sz="3600" dirty="0" smtClean="0"/>
-              <a:t>Другие </a:t>
-            </a:r>
-            <a:r>
-              <a:rPr lang="ru-RU" sz="3600" dirty="0" smtClean="0"/>
-              <a:t>сервисы (в терминах </a:t>
+              <a:t>Другие сервисы (в терминах </a:t>
             </a:r>
             <a:r>
               <a:rPr lang="en-US" sz="3600" dirty="0" smtClean="0"/>
@@ -39680,11 +39534,7 @@
           <a:p>
             <a:r>
               <a:rPr lang="ru-RU" sz="3200" dirty="0" smtClean="0"/>
-              <a:t>Формат </a:t>
-            </a:r>
-            <a:r>
-              <a:rPr lang="ru-RU" sz="3200" dirty="0" smtClean="0"/>
-              <a:t>файла</a:t>
+              <a:t>Формат файла</a:t>
             </a:r>
           </a:p>
           <a:p>
@@ -39715,8 +39565,10 @@
                   </a:schemeClr>
                 </a:solidFill>
               </a:rPr>
-              <a:t>	если </a:t>
-            </a:r>
+              <a:t>	если его может понадобиться менять</a:t>
+            </a:r>
+          </a:p>
+          <a:p>
             <a:r>
               <a:rPr lang="ru-RU" i="1" dirty="0" smtClean="0">
                 <a:solidFill>
@@ -39725,9 +39577,9 @@
                   </a:schemeClr>
                 </a:solidFill>
               </a:rPr>
-              <a:t>его может </a:t>
-            </a:r>
-            <a:r>
+              <a:t>Реализация структуры данных</a:t>
+            </a:r>
+            <a:br>
               <a:rPr lang="ru-RU" i="1" dirty="0" smtClean="0">
                 <a:solidFill>
                   <a:schemeClr val="bg1">
@@ -39735,17 +39587,7 @@
                   </a:schemeClr>
                 </a:solidFill>
               </a:rPr>
-              <a:t>понадобиться менять</a:t>
-            </a:r>
-            <a:endParaRPr lang="ru-RU" i="1" dirty="0" smtClean="0">
-              <a:solidFill>
-                <a:schemeClr val="bg1">
-                  <a:lumMod val="50000"/>
-                </a:schemeClr>
-              </a:solidFill>
-            </a:endParaRPr>
-          </a:p>
-          <a:p>
+            </a:br>
             <a:r>
               <a:rPr lang="ru-RU" i="1" dirty="0" smtClean="0">
                 <a:solidFill>
@@ -39754,44 +39596,8 @@
                   </a:schemeClr>
                 </a:solidFill>
               </a:rPr>
-              <a:t>Реализация структуры </a:t>
-            </a:r>
-            <a:r>
-              <a:rPr lang="ru-RU" i="1" dirty="0" smtClean="0">
-                <a:solidFill>
-                  <a:schemeClr val="bg1">
-                    <a:lumMod val="50000"/>
-                  </a:schemeClr>
-                </a:solidFill>
-              </a:rPr>
-              <a:t>данных</a:t>
-            </a:r>
-            <a:br>
-              <a:rPr lang="ru-RU" i="1" dirty="0" smtClean="0">
-                <a:solidFill>
-                  <a:schemeClr val="bg1">
-                    <a:lumMod val="50000"/>
-                  </a:schemeClr>
-                </a:solidFill>
-              </a:rPr>
-            </a:br>
-            <a:r>
-              <a:rPr lang="ru-RU" i="1" dirty="0" smtClean="0">
-                <a:solidFill>
-                  <a:schemeClr val="bg1">
-                    <a:lumMod val="50000"/>
-                  </a:schemeClr>
-                </a:solidFill>
-              </a:rPr>
               <a:t>	если её может понадобиться менять</a:t>
             </a:r>
-            <a:endParaRPr lang="ru-RU" i="1" dirty="0" smtClean="0">
-              <a:solidFill>
-                <a:schemeClr val="bg1">
-                  <a:lumMod val="50000"/>
-                </a:schemeClr>
-              </a:solidFill>
-            </a:endParaRPr>
           </a:p>
         </p:txBody>
       </p:sp>
@@ -43256,7 +43062,12 @@
             <p:ph type="title"/>
           </p:nvPr>
         </p:nvSpPr>
-        <p:spPr/>
+        <p:spPr>
+          <a:xfrm>
+            <a:off x="628650" y="393119"/>
+            <a:ext cx="7886700" cy="1325563"/>
+          </a:xfrm>
+        </p:spPr>
         <p:txBody>
           <a:bodyPr/>
           <a:lstStyle/>
@@ -46851,11 +46662,7 @@
             </a:r>
             <a:r>
               <a:rPr lang="ru-RU" dirty="0" smtClean="0"/>
-              <a:t>— заменить зависимости </a:t>
-            </a:r>
-            <a:r>
-              <a:rPr lang="ru-RU" dirty="0" smtClean="0"/>
-              <a:t>заглушками</a:t>
+              <a:t>— заменить зависимости заглушками</a:t>
             </a:r>
             <a:r>
               <a:rPr lang="ru-RU" dirty="0"/>
@@ -46881,11 +46688,7 @@
             </a:r>
             <a:r>
               <a:rPr lang="ru-RU" dirty="0" smtClean="0"/>
-              <a:t> </a:t>
-            </a:r>
-            <a:r>
-              <a:rPr lang="ru-RU" dirty="0" smtClean="0"/>
-              <a:t>—проверить корректность взаимодействия</a:t>
+              <a:t> —проверить корректность взаимодействия</a:t>
             </a:r>
             <a:endParaRPr lang="en-US" dirty="0" smtClean="0"/>
           </a:p>
@@ -46908,13 +46711,8 @@
             </a:r>
             <a:r>
               <a:rPr lang="ru-RU" dirty="0"/>
-              <a:t> </a:t>
-            </a:r>
-            <a:r>
-              <a:rPr lang="ru-RU" dirty="0"/>
-              <a:t>— надо делать заглушку :(</a:t>
-            </a:r>
-            <a:endParaRPr lang="ru-RU" dirty="0"/>
+              <a:t> — надо делать заглушку :(</a:t>
+            </a:r>
           </a:p>
         </p:txBody>
       </p:sp>
@@ -49328,19 +49126,11 @@
             </a:r>
             <a:r>
               <a:rPr lang="en-US" sz="2400" dirty="0" smtClean="0"/>
-              <a:t>Pure </a:t>
-            </a:r>
-            <a:r>
-              <a:rPr lang="en-US" sz="2400" dirty="0" smtClean="0"/>
-              <a:t>functions &amp; </a:t>
+              <a:t>Pure functions &amp; </a:t>
             </a:r>
             <a:r>
               <a:rPr lang="en-US" sz="2400" dirty="0" err="1" smtClean="0"/>
-              <a:t>c</a:t>
-            </a:r>
-            <a:r>
-              <a:rPr lang="en-US" sz="2400" dirty="0" err="1" smtClean="0"/>
-              <a:t>ombinators</a:t>
+              <a:t>combinators</a:t>
             </a:r>
             <a:r>
               <a:rPr lang="en-US" sz="2400" dirty="0" smtClean="0"/>
@@ -49354,7 +49144,6 @@
               <a:rPr lang="en-US" sz="2400" dirty="0" smtClean="0"/>
               <a:t>LINQ)</a:t>
             </a:r>
-            <a:endParaRPr lang="en-US" sz="2400" dirty="0" smtClean="0"/>
           </a:p>
           <a:p>
             <a:pPr marL="0" indent="0">

</xml_diff>